<commit_message>
fix typos in basic stats
</commit_message>
<xml_diff>
--- a/Presentations/Stats - Basics - Terms.pptx
+++ b/Presentations/Stats - Basics - Terms.pptx
@@ -206,7 +206,7 @@
           <a:p>
             <a:fld id="{FAF957FC-5175-49AC-8D2B-2F056FFFC1DD}" type="datetimeFigureOut">
               <a:rPr lang="en-US" smtClean="0"/>
-              <a:t>7/21/2017</a:t>
+              <a:t>7/30/2017</a:t>
             </a:fld>
             <a:endParaRPr lang="en-US"/>
           </a:p>
@@ -656,7 +656,7 @@
             <a:fld id="{1D8BD707-D9CF-40AE-B4C6-C98DA3205C09}" type="datetimeFigureOut">
               <a:rPr lang="en-US" smtClean="0"/>
               <a:pPr/>
-              <a:t>7/21/2017</a:t>
+              <a:t>7/30/2017</a:t>
             </a:fld>
             <a:endParaRPr lang="en-US"/>
           </a:p>
@@ -823,7 +823,7 @@
             <a:fld id="{1D8BD707-D9CF-40AE-B4C6-C98DA3205C09}" type="datetimeFigureOut">
               <a:rPr lang="en-US" smtClean="0"/>
               <a:pPr/>
-              <a:t>7/21/2017</a:t>
+              <a:t>7/30/2017</a:t>
             </a:fld>
             <a:endParaRPr lang="en-US"/>
           </a:p>
@@ -1000,7 +1000,7 @@
             <a:fld id="{1D8BD707-D9CF-40AE-B4C6-C98DA3205C09}" type="datetimeFigureOut">
               <a:rPr lang="en-US" smtClean="0"/>
               <a:pPr/>
-              <a:t>7/21/2017</a:t>
+              <a:t>7/30/2017</a:t>
             </a:fld>
             <a:endParaRPr lang="en-US"/>
           </a:p>
@@ -1167,7 +1167,7 @@
             <a:fld id="{1D8BD707-D9CF-40AE-B4C6-C98DA3205C09}" type="datetimeFigureOut">
               <a:rPr lang="en-US" smtClean="0"/>
               <a:pPr/>
-              <a:t>7/21/2017</a:t>
+              <a:t>7/30/2017</a:t>
             </a:fld>
             <a:endParaRPr lang="en-US"/>
           </a:p>
@@ -1410,7 +1410,7 @@
             <a:fld id="{1D8BD707-D9CF-40AE-B4C6-C98DA3205C09}" type="datetimeFigureOut">
               <a:rPr lang="en-US" smtClean="0"/>
               <a:pPr/>
-              <a:t>7/21/2017</a:t>
+              <a:t>7/30/2017</a:t>
             </a:fld>
             <a:endParaRPr lang="en-US"/>
           </a:p>
@@ -1695,7 +1695,7 @@
             <a:fld id="{1D8BD707-D9CF-40AE-B4C6-C98DA3205C09}" type="datetimeFigureOut">
               <a:rPr lang="en-US" smtClean="0"/>
               <a:pPr/>
-              <a:t>7/21/2017</a:t>
+              <a:t>7/30/2017</a:t>
             </a:fld>
             <a:endParaRPr lang="en-US"/>
           </a:p>
@@ -2114,7 +2114,7 @@
             <a:fld id="{1D8BD707-D9CF-40AE-B4C6-C98DA3205C09}" type="datetimeFigureOut">
               <a:rPr lang="en-US" smtClean="0"/>
               <a:pPr/>
-              <a:t>7/21/2017</a:t>
+              <a:t>7/30/2017</a:t>
             </a:fld>
             <a:endParaRPr lang="en-US"/>
           </a:p>
@@ -2229,7 +2229,7 @@
             <a:fld id="{1D8BD707-D9CF-40AE-B4C6-C98DA3205C09}" type="datetimeFigureOut">
               <a:rPr lang="en-US" smtClean="0"/>
               <a:pPr/>
-              <a:t>7/21/2017</a:t>
+              <a:t>7/30/2017</a:t>
             </a:fld>
             <a:endParaRPr lang="en-US"/>
           </a:p>
@@ -2321,7 +2321,7 @@
             <a:fld id="{1D8BD707-D9CF-40AE-B4C6-C98DA3205C09}" type="datetimeFigureOut">
               <a:rPr lang="en-US" smtClean="0"/>
               <a:pPr/>
-              <a:t>7/21/2017</a:t>
+              <a:t>7/30/2017</a:t>
             </a:fld>
             <a:endParaRPr lang="en-US"/>
           </a:p>
@@ -2595,7 +2595,7 @@
             <a:fld id="{1D8BD707-D9CF-40AE-B4C6-C98DA3205C09}" type="datetimeFigureOut">
               <a:rPr lang="en-US" smtClean="0"/>
               <a:pPr/>
-              <a:t>7/21/2017</a:t>
+              <a:t>7/30/2017</a:t>
             </a:fld>
             <a:endParaRPr lang="en-US"/>
           </a:p>
@@ -2845,7 +2845,7 @@
             <a:fld id="{1D8BD707-D9CF-40AE-B4C6-C98DA3205C09}" type="datetimeFigureOut">
               <a:rPr lang="en-US" smtClean="0"/>
               <a:pPr/>
-              <a:t>7/21/2017</a:t>
+              <a:t>7/30/2017</a:t>
             </a:fld>
             <a:endParaRPr lang="en-US"/>
           </a:p>
@@ -3055,7 +3055,7 @@
             <a:fld id="{1D8BD707-D9CF-40AE-B4C6-C98DA3205C09}" type="datetimeFigureOut">
               <a:rPr lang="en-US" smtClean="0"/>
               <a:pPr/>
-              <a:t>7/21/2017</a:t>
+              <a:t>7/30/2017</a:t>
             </a:fld>
             <a:endParaRPr lang="en-US"/>
           </a:p>
@@ -8797,27 +8797,7 @@
                   </a:schemeClr>
                 </a:solidFill>
               </a:rPr>
-              <a:t>A method u</a:t>
-            </a:r>
-            <a:r>
-              <a:rPr lang="en-US" sz="2400" b="1" dirty="0" smtClean="0">
-                <a:solidFill>
-                  <a:schemeClr val="accent5">
-                    <a:lumMod val="75000"/>
-                  </a:schemeClr>
-                </a:solidFill>
-              </a:rPr>
-              <a:t>sed to </a:t>
-            </a:r>
-            <a:r>
-              <a:rPr lang="en-US" sz="2400" b="1" dirty="0" smtClean="0">
-                <a:solidFill>
-                  <a:schemeClr val="accent5">
-                    <a:lumMod val="75000"/>
-                  </a:schemeClr>
-                </a:solidFill>
-              </a:rPr>
-              <a:t>visualize the </a:t>
+              <a:t>A method used to visualize the </a:t>
             </a:r>
             <a:r>
               <a:rPr lang="en-US" sz="2400" b="1" dirty="0" smtClean="0">
@@ -12088,7 +12068,13 @@
                             <a:rPr lang="en-US" b="0" i="1" smtClean="0">
                               <a:latin typeface="Cambria Math"/>
                             </a:rPr>
-                            <m:t>=0</m:t>
+                            <m:t>=</m:t>
+                          </m:r>
+                          <m:r>
+                            <a:rPr lang="en-US" b="0" i="1" smtClean="0">
+                              <a:latin typeface="Cambria Math"/>
+                            </a:rPr>
+                            <m:t>0</m:t>
                           </m:r>
                         </m:sub>
                         <m:sup>
@@ -15536,7 +15522,49 @@
                                   <m:nor/>
                                 </m:rPr>
                                 <a:rPr lang="en-US" sz="1200" dirty="0"/>
-                                <m:t>(2.5 – 1)</m:t>
+                                <m:t>(</m:t>
+                              </m:r>
+                              <m:r>
+                                <m:rPr>
+                                  <m:nor/>
+                                </m:rPr>
+                                <a:rPr lang="en-US" sz="1200" dirty="0"/>
+                                <m:t>2</m:t>
+                              </m:r>
+                              <m:r>
+                                <m:rPr>
+                                  <m:nor/>
+                                </m:rPr>
+                                <a:rPr lang="en-US" sz="1200" dirty="0"/>
+                                <m:t>.</m:t>
+                              </m:r>
+                              <m:r>
+                                <m:rPr>
+                                  <m:nor/>
+                                </m:rPr>
+                                <a:rPr lang="en-US" sz="1200" dirty="0"/>
+                                <m:t>5 </m:t>
+                              </m:r>
+                              <m:r>
+                                <m:rPr>
+                                  <m:nor/>
+                                </m:rPr>
+                                <a:rPr lang="en-US" sz="1200" dirty="0"/>
+                                <m:t>– </m:t>
+                              </m:r>
+                              <m:r>
+                                <m:rPr>
+                                  <m:nor/>
+                                </m:rPr>
+                                <a:rPr lang="en-US" sz="1200" dirty="0"/>
+                                <m:t>1</m:t>
+                              </m:r>
+                              <m:r>
+                                <m:rPr>
+                                  <m:nor/>
+                                </m:rPr>
+                                <a:rPr lang="en-US" sz="1200" dirty="0"/>
+                                <m:t>)</m:t>
                               </m:r>
                               <m:r>
                                 <m:rPr>
@@ -15550,7 +15578,49 @@
                                   <m:nor/>
                                 </m:rPr>
                                 <a:rPr lang="en-US" sz="1200" dirty="0"/>
-                                <m:t>+ (2.5 – 2)</m:t>
+                                <m:t>+ (</m:t>
+                              </m:r>
+                              <m:r>
+                                <m:rPr>
+                                  <m:nor/>
+                                </m:rPr>
+                                <a:rPr lang="en-US" sz="1200" dirty="0"/>
+                                <m:t>2</m:t>
+                              </m:r>
+                              <m:r>
+                                <m:rPr>
+                                  <m:nor/>
+                                </m:rPr>
+                                <a:rPr lang="en-US" sz="1200" dirty="0"/>
+                                <m:t>.</m:t>
+                              </m:r>
+                              <m:r>
+                                <m:rPr>
+                                  <m:nor/>
+                                </m:rPr>
+                                <a:rPr lang="en-US" sz="1200" dirty="0"/>
+                                <m:t>5 </m:t>
+                              </m:r>
+                              <m:r>
+                                <m:rPr>
+                                  <m:nor/>
+                                </m:rPr>
+                                <a:rPr lang="en-US" sz="1200" dirty="0"/>
+                                <m:t>– </m:t>
+                              </m:r>
+                              <m:r>
+                                <m:rPr>
+                                  <m:nor/>
+                                </m:rPr>
+                                <a:rPr lang="en-US" sz="1200" dirty="0"/>
+                                <m:t>2</m:t>
+                              </m:r>
+                              <m:r>
+                                <m:rPr>
+                                  <m:nor/>
+                                </m:rPr>
+                                <a:rPr lang="en-US" sz="1200" dirty="0"/>
+                                <m:t>)</m:t>
                               </m:r>
                               <m:r>
                                 <m:rPr>
@@ -15564,7 +15634,70 @@
                                   <m:nor/>
                                 </m:rPr>
                                 <a:rPr lang="en-US" sz="1200" dirty="0"/>
-                                <m:t> + (2.5 – 2.5)</m:t>
+                                <m:t> </m:t>
+                              </m:r>
+                              <m:r>
+                                <m:rPr>
+                                  <m:nor/>
+                                </m:rPr>
+                                <a:rPr lang="en-US" sz="1200" dirty="0"/>
+                                <m:t>+ (</m:t>
+                              </m:r>
+                              <m:r>
+                                <m:rPr>
+                                  <m:nor/>
+                                </m:rPr>
+                                <a:rPr lang="en-US" sz="1200" dirty="0"/>
+                                <m:t>2</m:t>
+                              </m:r>
+                              <m:r>
+                                <m:rPr>
+                                  <m:nor/>
+                                </m:rPr>
+                                <a:rPr lang="en-US" sz="1200" dirty="0"/>
+                                <m:t>.</m:t>
+                              </m:r>
+                              <m:r>
+                                <m:rPr>
+                                  <m:nor/>
+                                </m:rPr>
+                                <a:rPr lang="en-US" sz="1200" dirty="0"/>
+                                <m:t>5 </m:t>
+                              </m:r>
+                              <m:r>
+                                <m:rPr>
+                                  <m:nor/>
+                                </m:rPr>
+                                <a:rPr lang="en-US" sz="1200" dirty="0"/>
+                                <m:t>– </m:t>
+                              </m:r>
+                              <m:r>
+                                <m:rPr>
+                                  <m:nor/>
+                                </m:rPr>
+                                <a:rPr lang="en-US" sz="1200" dirty="0"/>
+                                <m:t>2</m:t>
+                              </m:r>
+                              <m:r>
+                                <m:rPr>
+                                  <m:nor/>
+                                </m:rPr>
+                                <a:rPr lang="en-US" sz="1200" dirty="0"/>
+                                <m:t>.</m:t>
+                              </m:r>
+                              <m:r>
+                                <m:rPr>
+                                  <m:nor/>
+                                </m:rPr>
+                                <a:rPr lang="en-US" sz="1200" dirty="0"/>
+                                <m:t>5</m:t>
+                              </m:r>
+                              <m:r>
+                                <m:rPr>
+                                  <m:nor/>
+                                </m:rPr>
+                                <a:rPr lang="en-US" sz="1200" dirty="0"/>
+                                <m:t>)</m:t>
                               </m:r>
                               <m:r>
                                 <m:rPr>
@@ -15578,7 +15711,63 @@
                                   <m:nor/>
                                 </m:rPr>
                                 <a:rPr lang="en-US" sz="1200" dirty="0"/>
-                                <m:t>+ (2.5 – 2.5)</m:t>
+                                <m:t>+ (</m:t>
+                              </m:r>
+                              <m:r>
+                                <m:rPr>
+                                  <m:nor/>
+                                </m:rPr>
+                                <a:rPr lang="en-US" sz="1200" dirty="0"/>
+                                <m:t>2</m:t>
+                              </m:r>
+                              <m:r>
+                                <m:rPr>
+                                  <m:nor/>
+                                </m:rPr>
+                                <a:rPr lang="en-US" sz="1200" dirty="0"/>
+                                <m:t>.</m:t>
+                              </m:r>
+                              <m:r>
+                                <m:rPr>
+                                  <m:nor/>
+                                </m:rPr>
+                                <a:rPr lang="en-US" sz="1200" dirty="0"/>
+                                <m:t>5 </m:t>
+                              </m:r>
+                              <m:r>
+                                <m:rPr>
+                                  <m:nor/>
+                                </m:rPr>
+                                <a:rPr lang="en-US" sz="1200" dirty="0"/>
+                                <m:t>– </m:t>
+                              </m:r>
+                              <m:r>
+                                <m:rPr>
+                                  <m:nor/>
+                                </m:rPr>
+                                <a:rPr lang="en-US" sz="1200" dirty="0"/>
+                                <m:t>2</m:t>
+                              </m:r>
+                              <m:r>
+                                <m:rPr>
+                                  <m:nor/>
+                                </m:rPr>
+                                <a:rPr lang="en-US" sz="1200" dirty="0"/>
+                                <m:t>.</m:t>
+                              </m:r>
+                              <m:r>
+                                <m:rPr>
+                                  <m:nor/>
+                                </m:rPr>
+                                <a:rPr lang="en-US" sz="1200" dirty="0"/>
+                                <m:t>5</m:t>
+                              </m:r>
+                              <m:r>
+                                <m:rPr>
+                                  <m:nor/>
+                                </m:rPr>
+                                <a:rPr lang="en-US" sz="1200" dirty="0"/>
+                                <m:t>)</m:t>
                               </m:r>
                               <m:r>
                                 <m:rPr>
@@ -15592,7 +15781,56 @@
                                   <m:nor/>
                                 </m:rPr>
                                 <a:rPr lang="en-US" sz="1200" dirty="0"/>
-                                <m:t> + (2.5 – 3)</m:t>
+                                <m:t> </m:t>
+                              </m:r>
+                              <m:r>
+                                <m:rPr>
+                                  <m:nor/>
+                                </m:rPr>
+                                <a:rPr lang="en-US" sz="1200" dirty="0"/>
+                                <m:t>+ (</m:t>
+                              </m:r>
+                              <m:r>
+                                <m:rPr>
+                                  <m:nor/>
+                                </m:rPr>
+                                <a:rPr lang="en-US" sz="1200" dirty="0"/>
+                                <m:t>2</m:t>
+                              </m:r>
+                              <m:r>
+                                <m:rPr>
+                                  <m:nor/>
+                                </m:rPr>
+                                <a:rPr lang="en-US" sz="1200" dirty="0"/>
+                                <m:t>.</m:t>
+                              </m:r>
+                              <m:r>
+                                <m:rPr>
+                                  <m:nor/>
+                                </m:rPr>
+                                <a:rPr lang="en-US" sz="1200" dirty="0"/>
+                                <m:t>5 </m:t>
+                              </m:r>
+                              <m:r>
+                                <m:rPr>
+                                  <m:nor/>
+                                </m:rPr>
+                                <a:rPr lang="en-US" sz="1200" dirty="0"/>
+                                <m:t>– </m:t>
+                              </m:r>
+                              <m:r>
+                                <m:rPr>
+                                  <m:nor/>
+                                </m:rPr>
+                                <a:rPr lang="en-US" sz="1200" dirty="0"/>
+                                <m:t>3</m:t>
+                              </m:r>
+                              <m:r>
+                                <m:rPr>
+                                  <m:nor/>
+                                </m:rPr>
+                                <a:rPr lang="en-US" sz="1200" dirty="0"/>
+                                <m:t>)</m:t>
                               </m:r>
                               <m:r>
                                 <m:rPr>
@@ -15606,7 +15844,56 @@
                                   <m:nor/>
                                 </m:rPr>
                                 <a:rPr lang="en-US" sz="1200" dirty="0"/>
-                                <m:t> + (2.5 – 3)</m:t>
+                                <m:t> </m:t>
+                              </m:r>
+                              <m:r>
+                                <m:rPr>
+                                  <m:nor/>
+                                </m:rPr>
+                                <a:rPr lang="en-US" sz="1200" dirty="0"/>
+                                <m:t>+ (</m:t>
+                              </m:r>
+                              <m:r>
+                                <m:rPr>
+                                  <m:nor/>
+                                </m:rPr>
+                                <a:rPr lang="en-US" sz="1200" dirty="0"/>
+                                <m:t>2</m:t>
+                              </m:r>
+                              <m:r>
+                                <m:rPr>
+                                  <m:nor/>
+                                </m:rPr>
+                                <a:rPr lang="en-US" sz="1200" dirty="0"/>
+                                <m:t>.</m:t>
+                              </m:r>
+                              <m:r>
+                                <m:rPr>
+                                  <m:nor/>
+                                </m:rPr>
+                                <a:rPr lang="en-US" sz="1200" dirty="0"/>
+                                <m:t>5 </m:t>
+                              </m:r>
+                              <m:r>
+                                <m:rPr>
+                                  <m:nor/>
+                                </m:rPr>
+                                <a:rPr lang="en-US" sz="1200" dirty="0"/>
+                                <m:t>– </m:t>
+                              </m:r>
+                              <m:r>
+                                <m:rPr>
+                                  <m:nor/>
+                                </m:rPr>
+                                <a:rPr lang="en-US" sz="1200" dirty="0"/>
+                                <m:t>3</m:t>
+                              </m:r>
+                              <m:r>
+                                <m:rPr>
+                                  <m:nor/>
+                                </m:rPr>
+                                <a:rPr lang="en-US" sz="1200" dirty="0"/>
+                                <m:t>)</m:t>
                               </m:r>
                               <m:r>
                                 <m:rPr>
@@ -15620,7 +15907,70 @@
                                   <m:nor/>
                                 </m:rPr>
                                 <a:rPr lang="en-US" sz="1200" dirty="0"/>
-                                <m:t> + (2.5 – 3.5)</m:t>
+                                <m:t> </m:t>
+                              </m:r>
+                              <m:r>
+                                <m:rPr>
+                                  <m:nor/>
+                                </m:rPr>
+                                <a:rPr lang="en-US" sz="1200" dirty="0"/>
+                                <m:t>+ (</m:t>
+                              </m:r>
+                              <m:r>
+                                <m:rPr>
+                                  <m:nor/>
+                                </m:rPr>
+                                <a:rPr lang="en-US" sz="1200" dirty="0"/>
+                                <m:t>2</m:t>
+                              </m:r>
+                              <m:r>
+                                <m:rPr>
+                                  <m:nor/>
+                                </m:rPr>
+                                <a:rPr lang="en-US" sz="1200" dirty="0"/>
+                                <m:t>.</m:t>
+                              </m:r>
+                              <m:r>
+                                <m:rPr>
+                                  <m:nor/>
+                                </m:rPr>
+                                <a:rPr lang="en-US" sz="1200" dirty="0"/>
+                                <m:t>5 </m:t>
+                              </m:r>
+                              <m:r>
+                                <m:rPr>
+                                  <m:nor/>
+                                </m:rPr>
+                                <a:rPr lang="en-US" sz="1200" dirty="0"/>
+                                <m:t>– </m:t>
+                              </m:r>
+                              <m:r>
+                                <m:rPr>
+                                  <m:nor/>
+                                </m:rPr>
+                                <a:rPr lang="en-US" sz="1200" dirty="0"/>
+                                <m:t>3</m:t>
+                              </m:r>
+                              <m:r>
+                                <m:rPr>
+                                  <m:nor/>
+                                </m:rPr>
+                                <a:rPr lang="en-US" sz="1200" dirty="0"/>
+                                <m:t>.</m:t>
+                              </m:r>
+                              <m:r>
+                                <m:rPr>
+                                  <m:nor/>
+                                </m:rPr>
+                                <a:rPr lang="en-US" sz="1200" dirty="0"/>
+                                <m:t>5</m:t>
+                              </m:r>
+                              <m:r>
+                                <m:rPr>
+                                  <m:nor/>
+                                </m:rPr>
+                                <a:rPr lang="en-US" sz="1200" dirty="0"/>
+                                <m:t>)</m:t>
                               </m:r>
                               <m:r>
                                 <m:rPr>
@@ -15783,7 +16133,187 @@
                                 <a:rPr lang="en-US" sz="1200" b="0" i="0" smtClean="0">
                                   <a:latin typeface="Cambria Math"/>
                                 </a:rPr>
-                                <m:t>2.25 + 0.25 + 0 + 0 + 0.25 + 0.25 + 1 </m:t>
+                                <m:t>2</m:t>
+                              </m:r>
+                              <m:r>
+                                <m:rPr>
+                                  <m:nor/>
+                                </m:rPr>
+                                <a:rPr lang="en-US" sz="1200" b="0" i="0" smtClean="0">
+                                  <a:latin typeface="Cambria Math"/>
+                                </a:rPr>
+                                <m:t>.</m:t>
+                              </m:r>
+                              <m:r>
+                                <m:rPr>
+                                  <m:nor/>
+                                </m:rPr>
+                                <a:rPr lang="en-US" sz="1200" b="0" i="0" smtClean="0">
+                                  <a:latin typeface="Cambria Math"/>
+                                </a:rPr>
+                                <m:t>25 </m:t>
+                              </m:r>
+                              <m:r>
+                                <m:rPr>
+                                  <m:nor/>
+                                </m:rPr>
+                                <a:rPr lang="en-US" sz="1200" b="0" i="0" smtClean="0">
+                                  <a:latin typeface="Cambria Math"/>
+                                </a:rPr>
+                                <m:t>+ </m:t>
+                              </m:r>
+                              <m:r>
+                                <m:rPr>
+                                  <m:nor/>
+                                </m:rPr>
+                                <a:rPr lang="en-US" sz="1200" b="0" i="0" smtClean="0">
+                                  <a:latin typeface="Cambria Math"/>
+                                </a:rPr>
+                                <m:t>0</m:t>
+                              </m:r>
+                              <m:r>
+                                <m:rPr>
+                                  <m:nor/>
+                                </m:rPr>
+                                <a:rPr lang="en-US" sz="1200" b="0" i="0" smtClean="0">
+                                  <a:latin typeface="Cambria Math"/>
+                                </a:rPr>
+                                <m:t>.</m:t>
+                              </m:r>
+                              <m:r>
+                                <m:rPr>
+                                  <m:nor/>
+                                </m:rPr>
+                                <a:rPr lang="en-US" sz="1200" b="0" i="0" smtClean="0">
+                                  <a:latin typeface="Cambria Math"/>
+                                </a:rPr>
+                                <m:t>25 </m:t>
+                              </m:r>
+                              <m:r>
+                                <m:rPr>
+                                  <m:nor/>
+                                </m:rPr>
+                                <a:rPr lang="en-US" sz="1200" b="0" i="0" smtClean="0">
+                                  <a:latin typeface="Cambria Math"/>
+                                </a:rPr>
+                                <m:t>+ </m:t>
+                              </m:r>
+                              <m:r>
+                                <m:rPr>
+                                  <m:nor/>
+                                </m:rPr>
+                                <a:rPr lang="en-US" sz="1200" b="0" i="0" smtClean="0">
+                                  <a:latin typeface="Cambria Math"/>
+                                </a:rPr>
+                                <m:t>0 </m:t>
+                              </m:r>
+                              <m:r>
+                                <m:rPr>
+                                  <m:nor/>
+                                </m:rPr>
+                                <a:rPr lang="en-US" sz="1200" b="0" i="0" smtClean="0">
+                                  <a:latin typeface="Cambria Math"/>
+                                </a:rPr>
+                                <m:t>+ </m:t>
+                              </m:r>
+                              <m:r>
+                                <m:rPr>
+                                  <m:nor/>
+                                </m:rPr>
+                                <a:rPr lang="en-US" sz="1200" b="0" i="0" smtClean="0">
+                                  <a:latin typeface="Cambria Math"/>
+                                </a:rPr>
+                                <m:t>0 </m:t>
+                              </m:r>
+                              <m:r>
+                                <m:rPr>
+                                  <m:nor/>
+                                </m:rPr>
+                                <a:rPr lang="en-US" sz="1200" b="0" i="0" smtClean="0">
+                                  <a:latin typeface="Cambria Math"/>
+                                </a:rPr>
+                                <m:t>+ </m:t>
+                              </m:r>
+                              <m:r>
+                                <m:rPr>
+                                  <m:nor/>
+                                </m:rPr>
+                                <a:rPr lang="en-US" sz="1200" b="0" i="0" smtClean="0">
+                                  <a:latin typeface="Cambria Math"/>
+                                </a:rPr>
+                                <m:t>0</m:t>
+                              </m:r>
+                              <m:r>
+                                <m:rPr>
+                                  <m:nor/>
+                                </m:rPr>
+                                <a:rPr lang="en-US" sz="1200" b="0" i="0" smtClean="0">
+                                  <a:latin typeface="Cambria Math"/>
+                                </a:rPr>
+                                <m:t>.</m:t>
+                              </m:r>
+                              <m:r>
+                                <m:rPr>
+                                  <m:nor/>
+                                </m:rPr>
+                                <a:rPr lang="en-US" sz="1200" b="0" i="0" smtClean="0">
+                                  <a:latin typeface="Cambria Math"/>
+                                </a:rPr>
+                                <m:t>25 </m:t>
+                              </m:r>
+                              <m:r>
+                                <m:rPr>
+                                  <m:nor/>
+                                </m:rPr>
+                                <a:rPr lang="en-US" sz="1200" b="0" i="0" smtClean="0">
+                                  <a:latin typeface="Cambria Math"/>
+                                </a:rPr>
+                                <m:t>+ </m:t>
+                              </m:r>
+                              <m:r>
+                                <m:rPr>
+                                  <m:nor/>
+                                </m:rPr>
+                                <a:rPr lang="en-US" sz="1200" b="0" i="0" smtClean="0">
+                                  <a:latin typeface="Cambria Math"/>
+                                </a:rPr>
+                                <m:t>0</m:t>
+                              </m:r>
+                              <m:r>
+                                <m:rPr>
+                                  <m:nor/>
+                                </m:rPr>
+                                <a:rPr lang="en-US" sz="1200" b="0" i="0" smtClean="0">
+                                  <a:latin typeface="Cambria Math"/>
+                                </a:rPr>
+                                <m:t>.</m:t>
+                              </m:r>
+                              <m:r>
+                                <m:rPr>
+                                  <m:nor/>
+                                </m:rPr>
+                                <a:rPr lang="en-US" sz="1200" b="0" i="0" smtClean="0">
+                                  <a:latin typeface="Cambria Math"/>
+                                </a:rPr>
+                                <m:t>25 </m:t>
+                              </m:r>
+                              <m:r>
+                                <m:rPr>
+                                  <m:nor/>
+                                </m:rPr>
+                                <a:rPr lang="en-US" sz="1200" b="0" i="0" smtClean="0">
+                                  <a:latin typeface="Cambria Math"/>
+                                </a:rPr>
+                                <m:t>+ </m:t>
+                              </m:r>
+                              <m:r>
+                                <m:rPr>
+                                  <m:nor/>
+                                </m:rPr>
+                                <a:rPr lang="en-US" sz="1200" b="0" i="0" smtClean="0">
+                                  <a:latin typeface="Cambria Math"/>
+                                </a:rPr>
+                                <m:t>1 </m:t>
                               </m:r>
                             </m:e>
                           </m:nary>
@@ -15907,7 +16437,13 @@
                             <a:rPr lang="en-US" sz="1200" b="0" i="1" smtClean="0">
                               <a:latin typeface="Cambria Math"/>
                             </a:rPr>
-                            <m:t> ∗4</m:t>
+                            <m:t> ∗</m:t>
+                          </m:r>
+                          <m:r>
+                            <a:rPr lang="en-US" sz="1200" b="0" i="1" smtClean="0">
+                              <a:latin typeface="Cambria Math"/>
+                            </a:rPr>
+                            <m:t>4</m:t>
                           </m:r>
                         </m:e>
                       </m:rad>
@@ -17152,16 +17688,29 @@
                   <a:srgbClr val="00B050"/>
                 </a:solidFill>
               </a:rPr>
-              <a:t>Can calculate probability</a:t>
-            </a:r>
-          </a:p>
-          <a:p>
+              <a:t>Can calculate </a:t>
+            </a:r>
             <a:r>
               <a:rPr lang="en-US" sz="1400" dirty="0" smtClean="0">
                 <a:solidFill>
                   <a:srgbClr val="00B050"/>
                 </a:solidFill>
               </a:rPr>
+              <a:t>probability of</a:t>
+            </a:r>
+            <a:endParaRPr lang="en-US" sz="1400" dirty="0" smtClean="0">
+              <a:solidFill>
+                <a:srgbClr val="00B050"/>
+              </a:solidFill>
+            </a:endParaRPr>
+          </a:p>
+          <a:p>
+            <a:r>
+              <a:rPr lang="en-US" sz="1400" dirty="0" smtClean="0">
+                <a:solidFill>
+                  <a:srgbClr val="00B050"/>
+                </a:solidFill>
+              </a:rPr>
               <a:t>sample is in population, when</a:t>
             </a:r>
           </a:p>
@@ -17172,7 +17721,15 @@
                   <a:srgbClr val="00B050"/>
                 </a:solidFill>
               </a:rPr>
-              <a:t>Population is known.</a:t>
+              <a:t>population </a:t>
+            </a:r>
+            <a:r>
+              <a:rPr lang="en-US" sz="1400" dirty="0" smtClean="0">
+                <a:solidFill>
+                  <a:srgbClr val="00B050"/>
+                </a:solidFill>
+              </a:rPr>
+              <a:t>is known.</a:t>
             </a:r>
             <a:endParaRPr lang="en-US" sz="1400" dirty="0">
               <a:solidFill>

</xml_diff>

<commit_message>
start of house prices
</commit_message>
<xml_diff>
--- a/Presentations/Stats - Basics - Terms.pptx
+++ b/Presentations/Stats - Basics - Terms.pptx
@@ -206,7 +206,7 @@
           <a:p>
             <a:fld id="{FAF957FC-5175-49AC-8D2B-2F056FFFC1DD}" type="datetimeFigureOut">
               <a:rPr lang="en-US" smtClean="0"/>
-              <a:t>7/30/2017</a:t>
+              <a:t>9/17/2017</a:t>
             </a:fld>
             <a:endParaRPr lang="en-US"/>
           </a:p>
@@ -656,7 +656,7 @@
             <a:fld id="{1D8BD707-D9CF-40AE-B4C6-C98DA3205C09}" type="datetimeFigureOut">
               <a:rPr lang="en-US" smtClean="0"/>
               <a:pPr/>
-              <a:t>7/30/2017</a:t>
+              <a:t>9/17/2017</a:t>
             </a:fld>
             <a:endParaRPr lang="en-US"/>
           </a:p>
@@ -823,7 +823,7 @@
             <a:fld id="{1D8BD707-D9CF-40AE-B4C6-C98DA3205C09}" type="datetimeFigureOut">
               <a:rPr lang="en-US" smtClean="0"/>
               <a:pPr/>
-              <a:t>7/30/2017</a:t>
+              <a:t>9/17/2017</a:t>
             </a:fld>
             <a:endParaRPr lang="en-US"/>
           </a:p>
@@ -1000,7 +1000,7 @@
             <a:fld id="{1D8BD707-D9CF-40AE-B4C6-C98DA3205C09}" type="datetimeFigureOut">
               <a:rPr lang="en-US" smtClean="0"/>
               <a:pPr/>
-              <a:t>7/30/2017</a:t>
+              <a:t>9/17/2017</a:t>
             </a:fld>
             <a:endParaRPr lang="en-US"/>
           </a:p>
@@ -1167,7 +1167,7 @@
             <a:fld id="{1D8BD707-D9CF-40AE-B4C6-C98DA3205C09}" type="datetimeFigureOut">
               <a:rPr lang="en-US" smtClean="0"/>
               <a:pPr/>
-              <a:t>7/30/2017</a:t>
+              <a:t>9/17/2017</a:t>
             </a:fld>
             <a:endParaRPr lang="en-US"/>
           </a:p>
@@ -1410,7 +1410,7 @@
             <a:fld id="{1D8BD707-D9CF-40AE-B4C6-C98DA3205C09}" type="datetimeFigureOut">
               <a:rPr lang="en-US" smtClean="0"/>
               <a:pPr/>
-              <a:t>7/30/2017</a:t>
+              <a:t>9/17/2017</a:t>
             </a:fld>
             <a:endParaRPr lang="en-US"/>
           </a:p>
@@ -1695,7 +1695,7 @@
             <a:fld id="{1D8BD707-D9CF-40AE-B4C6-C98DA3205C09}" type="datetimeFigureOut">
               <a:rPr lang="en-US" smtClean="0"/>
               <a:pPr/>
-              <a:t>7/30/2017</a:t>
+              <a:t>9/17/2017</a:t>
             </a:fld>
             <a:endParaRPr lang="en-US"/>
           </a:p>
@@ -2114,7 +2114,7 @@
             <a:fld id="{1D8BD707-D9CF-40AE-B4C6-C98DA3205C09}" type="datetimeFigureOut">
               <a:rPr lang="en-US" smtClean="0"/>
               <a:pPr/>
-              <a:t>7/30/2017</a:t>
+              <a:t>9/17/2017</a:t>
             </a:fld>
             <a:endParaRPr lang="en-US"/>
           </a:p>
@@ -2229,7 +2229,7 @@
             <a:fld id="{1D8BD707-D9CF-40AE-B4C6-C98DA3205C09}" type="datetimeFigureOut">
               <a:rPr lang="en-US" smtClean="0"/>
               <a:pPr/>
-              <a:t>7/30/2017</a:t>
+              <a:t>9/17/2017</a:t>
             </a:fld>
             <a:endParaRPr lang="en-US"/>
           </a:p>
@@ -2321,7 +2321,7 @@
             <a:fld id="{1D8BD707-D9CF-40AE-B4C6-C98DA3205C09}" type="datetimeFigureOut">
               <a:rPr lang="en-US" smtClean="0"/>
               <a:pPr/>
-              <a:t>7/30/2017</a:t>
+              <a:t>9/17/2017</a:t>
             </a:fld>
             <a:endParaRPr lang="en-US"/>
           </a:p>
@@ -2595,7 +2595,7 @@
             <a:fld id="{1D8BD707-D9CF-40AE-B4C6-C98DA3205C09}" type="datetimeFigureOut">
               <a:rPr lang="en-US" smtClean="0"/>
               <a:pPr/>
-              <a:t>7/30/2017</a:t>
+              <a:t>9/17/2017</a:t>
             </a:fld>
             <a:endParaRPr lang="en-US"/>
           </a:p>
@@ -2845,7 +2845,7 @@
             <a:fld id="{1D8BD707-D9CF-40AE-B4C6-C98DA3205C09}" type="datetimeFigureOut">
               <a:rPr lang="en-US" smtClean="0"/>
               <a:pPr/>
-              <a:t>7/30/2017</a:t>
+              <a:t>9/17/2017</a:t>
             </a:fld>
             <a:endParaRPr lang="en-US"/>
           </a:p>
@@ -3055,7 +3055,7 @@
             <a:fld id="{1D8BD707-D9CF-40AE-B4C6-C98DA3205C09}" type="datetimeFigureOut">
               <a:rPr lang="en-US" smtClean="0"/>
               <a:pPr/>
-              <a:t>7/30/2017</a:t>
+              <a:t>9/17/2017</a:t>
             </a:fld>
             <a:endParaRPr lang="en-US"/>
           </a:p>
@@ -14918,8 +14918,8 @@
           </a:p>
         </p:txBody>
       </p:sp>
-      <mc:AlternateContent xmlns:mc="http://schemas.openxmlformats.org/markup-compatibility/2006" xmlns:a14="http://schemas.microsoft.com/office/drawing/2010/main">
-        <mc:Choice Requires="a14">
+      <mc:AlternateContent xmlns:mc="http://schemas.openxmlformats.org/markup-compatibility/2006">
+        <mc:Choice xmlns:a14="http://schemas.microsoft.com/office/drawing/2010/main" Requires="a14">
           <p:sp>
             <p:nvSpPr>
               <p:cNvPr id="3" name="TextBox 2"/>
@@ -15055,7 +15055,7 @@
             </p:txBody>
           </p:sp>
         </mc:Choice>
-        <mc:Fallback xmlns="">
+        <mc:Fallback>
           <p:sp>
             <p:nvSpPr>
               <p:cNvPr id="3" name="TextBox 2"/>
@@ -17688,21 +17688,18 @@
                   <a:srgbClr val="00B050"/>
                 </a:solidFill>
               </a:rPr>
-              <a:t>Can calculate </a:t>
-            </a:r>
+              <a:t>Can calculate probability of</a:t>
+            </a:r>
+          </a:p>
+          <a:p>
             <a:r>
               <a:rPr lang="en-US" sz="1400" dirty="0" smtClean="0">
                 <a:solidFill>
                   <a:srgbClr val="00B050"/>
                 </a:solidFill>
               </a:rPr>
-              <a:t>probability of</a:t>
-            </a:r>
-            <a:endParaRPr lang="en-US" sz="1400" dirty="0" smtClean="0">
-              <a:solidFill>
-                <a:srgbClr val="00B050"/>
-              </a:solidFill>
-            </a:endParaRPr>
+              <a:t>sample is in population, when</a:t>
+            </a:r>
           </a:p>
           <a:p>
             <a:r>
@@ -17711,25 +17708,7 @@
                   <a:srgbClr val="00B050"/>
                 </a:solidFill>
               </a:rPr>
-              <a:t>sample is in population, when</a:t>
-            </a:r>
-          </a:p>
-          <a:p>
-            <a:r>
-              <a:rPr lang="en-US" sz="1400" dirty="0" smtClean="0">
-                <a:solidFill>
-                  <a:srgbClr val="00B050"/>
-                </a:solidFill>
-              </a:rPr>
-              <a:t>population </a:t>
-            </a:r>
-            <a:r>
-              <a:rPr lang="en-US" sz="1400" dirty="0" smtClean="0">
-                <a:solidFill>
-                  <a:srgbClr val="00B050"/>
-                </a:solidFill>
-              </a:rPr>
-              <a:t>is known.</a:t>
+              <a:t>population is known.</a:t>
             </a:r>
             <a:endParaRPr lang="en-US" sz="1400" dirty="0">
               <a:solidFill>

</xml_diff>